<commit_message>
see if I must add comment to commit
</commit_message>
<xml_diff>
--- a/GitHub Sample 4 PPT.pptx
+++ b/GitHub Sample 4 PPT.pptx
@@ -104,6 +104,11 @@
       </a:defRPr>
     </a:lvl9pPr>
   </p:defaultTextStyle>
+  <p:extLst>
+    <p:ext uri="{EFAFB233-063F-42B5-8137-9DF3F51BA10A}">
+      <p15:sldGuideLst xmlns:p15="http://schemas.microsoft.com/office/powerpoint/2012/main"/>
+    </p:ext>
+  </p:extLst>
 </p:presentation>
 </file>
 
@@ -3006,6 +3011,10 @@
           <a:bodyPr/>
           <a:lstStyle/>
           <a:p>
+            <a:r>
+              <a:rPr lang="en-US" smtClean="0"/>
+              <a:t>Update</a:t>
+            </a:r>
             <a:endParaRPr lang="en-US"/>
           </a:p>
         </p:txBody>

</xml_diff>

<commit_message>
try to tests by delete text
try to clean by deleting some text
</commit_message>
<xml_diff>
--- a/GitHub Sample 4 PPT.pptx
+++ b/GitHub Sample 4 PPT.pptx
@@ -243,7 +243,7 @@
           <a:p>
             <a:fld id="{5F964073-921C-43C0-9C57-4A48A4ED25FD}" type="datetimeFigureOut">
               <a:rPr lang="en-US" smtClean="0"/>
-              <a:t>4/3/2018</a:t>
+              <a:t>4/22/2018</a:t>
             </a:fld>
             <a:endParaRPr lang="en-US"/>
           </a:p>
@@ -413,7 +413,7 @@
           <a:p>
             <a:fld id="{5F964073-921C-43C0-9C57-4A48A4ED25FD}" type="datetimeFigureOut">
               <a:rPr lang="en-US" smtClean="0"/>
-              <a:t>4/3/2018</a:t>
+              <a:t>4/22/2018</a:t>
             </a:fld>
             <a:endParaRPr lang="en-US"/>
           </a:p>
@@ -593,7 +593,7 @@
           <a:p>
             <a:fld id="{5F964073-921C-43C0-9C57-4A48A4ED25FD}" type="datetimeFigureOut">
               <a:rPr lang="en-US" smtClean="0"/>
-              <a:t>4/3/2018</a:t>
+              <a:t>4/22/2018</a:t>
             </a:fld>
             <a:endParaRPr lang="en-US"/>
           </a:p>
@@ -763,7 +763,7 @@
           <a:p>
             <a:fld id="{5F964073-921C-43C0-9C57-4A48A4ED25FD}" type="datetimeFigureOut">
               <a:rPr lang="en-US" smtClean="0"/>
-              <a:t>4/3/2018</a:t>
+              <a:t>4/22/2018</a:t>
             </a:fld>
             <a:endParaRPr lang="en-US"/>
           </a:p>
@@ -1009,7 +1009,7 @@
           <a:p>
             <a:fld id="{5F964073-921C-43C0-9C57-4A48A4ED25FD}" type="datetimeFigureOut">
               <a:rPr lang="en-US" smtClean="0"/>
-              <a:t>4/3/2018</a:t>
+              <a:t>4/22/2018</a:t>
             </a:fld>
             <a:endParaRPr lang="en-US"/>
           </a:p>
@@ -1241,7 +1241,7 @@
           <a:p>
             <a:fld id="{5F964073-921C-43C0-9C57-4A48A4ED25FD}" type="datetimeFigureOut">
               <a:rPr lang="en-US" smtClean="0"/>
-              <a:t>4/3/2018</a:t>
+              <a:t>4/22/2018</a:t>
             </a:fld>
             <a:endParaRPr lang="en-US"/>
           </a:p>
@@ -1608,7 +1608,7 @@
           <a:p>
             <a:fld id="{5F964073-921C-43C0-9C57-4A48A4ED25FD}" type="datetimeFigureOut">
               <a:rPr lang="en-US" smtClean="0"/>
-              <a:t>4/3/2018</a:t>
+              <a:t>4/22/2018</a:t>
             </a:fld>
             <a:endParaRPr lang="en-US"/>
           </a:p>
@@ -1726,7 +1726,7 @@
           <a:p>
             <a:fld id="{5F964073-921C-43C0-9C57-4A48A4ED25FD}" type="datetimeFigureOut">
               <a:rPr lang="en-US" smtClean="0"/>
-              <a:t>4/3/2018</a:t>
+              <a:t>4/22/2018</a:t>
             </a:fld>
             <a:endParaRPr lang="en-US"/>
           </a:p>
@@ -1821,7 +1821,7 @@
           <a:p>
             <a:fld id="{5F964073-921C-43C0-9C57-4A48A4ED25FD}" type="datetimeFigureOut">
               <a:rPr lang="en-US" smtClean="0"/>
-              <a:t>4/3/2018</a:t>
+              <a:t>4/22/2018</a:t>
             </a:fld>
             <a:endParaRPr lang="en-US"/>
           </a:p>
@@ -2098,7 +2098,7 @@
           <a:p>
             <a:fld id="{5F964073-921C-43C0-9C57-4A48A4ED25FD}" type="datetimeFigureOut">
               <a:rPr lang="en-US" smtClean="0"/>
-              <a:t>4/3/2018</a:t>
+              <a:t>4/22/2018</a:t>
             </a:fld>
             <a:endParaRPr lang="en-US"/>
           </a:p>
@@ -2351,7 +2351,7 @@
           <a:p>
             <a:fld id="{5F964073-921C-43C0-9C57-4A48A4ED25FD}" type="datetimeFigureOut">
               <a:rPr lang="en-US" smtClean="0"/>
-              <a:t>4/3/2018</a:t>
+              <a:t>4/22/2018</a:t>
             </a:fld>
             <a:endParaRPr lang="en-US"/>
           </a:p>
@@ -2564,7 +2564,7 @@
           <a:p>
             <a:fld id="{5F964073-921C-43C0-9C57-4A48A4ED25FD}" type="datetimeFigureOut">
               <a:rPr lang="en-US" smtClean="0"/>
-              <a:t>4/3/2018</a:t>
+              <a:t>4/22/2018</a:t>
             </a:fld>
             <a:endParaRPr lang="en-US"/>
           </a:p>
@@ -2985,12 +2985,8 @@
           <a:lstStyle/>
           <a:p>
             <a:r>
-              <a:rPr lang="en-US" smtClean="0"/>
-              <a:t>GitHub Sample </a:t>
-            </a:r>
-            <a:r>
               <a:rPr lang="en-US" dirty="0" smtClean="0"/>
-              <a:t>4 PPT</a:t>
+              <a:t>GitHub</a:t>
             </a:r>
             <a:endParaRPr lang="en-US" dirty="0"/>
           </a:p>
@@ -3012,10 +3008,9 @@
           <a:lstStyle/>
           <a:p>
             <a:r>
-              <a:rPr lang="en-US" smtClean="0"/>
+              <a:rPr lang="en-US" dirty="0" smtClean="0"/>
               <a:t>Update</a:t>
             </a:r>
-            <a:endParaRPr lang="en-US"/>
           </a:p>
         </p:txBody>
       </p:sp>
@@ -3040,7 +3035,7 @@
         <a:sysClr val="windowText" lastClr="000000"/>
       </a:dk1>
       <a:lt1>
-        <a:sysClr val="window" lastClr="FFFF95"/>
+        <a:sysClr val="window" lastClr="FFFFFF"/>
       </a:lt1>
       <a:dk2>
         <a:srgbClr val="44546A"/>

</xml_diff>